<commit_message>
fib d- and -trad
</commit_message>
<xml_diff>
--- a/tasks6.pptx
+++ b/tasks6.pptx
@@ -4692,7 +4692,7 @@
             <p:spPr>
               <a:xfrm>
                 <a:off x="696000" y="729000"/>
-                <a:ext cx="10800000" cy="4154984"/>
+                <a:ext cx="10800000" cy="5262979"/>
               </a:xfrm>
               <a:prstGeom prst="rect">
                 <a:avLst/>
@@ -4904,7 +4904,7 @@
                           <a:ea typeface="+mj-ea"/>
                           <a:cs typeface="+mj-cs"/>
                         </a:rPr>
-                        <m:t>=1</m:t>
+                        <m:t>=1,</m:t>
                       </m:r>
                     </m:oMath>
                   </m:oMathPara>
@@ -5114,7 +5114,7 @@
                   <a:t>Define </a:t>
                 </a:r>
                 <a:r>
-                  <a:rPr lang="en-GB" sz="2400" dirty="0">
+                  <a:rPr lang="en-GB" sz="2400" dirty="0" err="1">
                     <a:solidFill>
                       <a:prstClr val="black"/>
                     </a:solidFill>
@@ -5122,7 +5122,7 @@
                     <a:ea typeface="+mj-ea"/>
                     <a:cs typeface="+mj-cs"/>
                   </a:rPr>
-                  <a:t>F</a:t>
+                  <a:t>F_d</a:t>
                 </a:r>
                 <a:r>
                   <a:rPr lang="en-GB" sz="2400" dirty="0">
@@ -5133,7 +5133,57 @@
                     <a:ea typeface="+mj-ea"/>
                     <a:cs typeface="+mj-cs"/>
                   </a:rPr>
-                  <a:t>.</a:t>
+                  <a:t> as a Fibonacci </a:t>
+                </a:r>
+                <a:r>
+                  <a:rPr lang="en-GB" sz="2400" dirty="0" err="1">
+                    <a:solidFill>
+                      <a:prstClr val="black"/>
+                    </a:solidFill>
+                    <a:latin typeface="Atkinson Hyperlegible" pitchFamily="50" charset="0"/>
+                    <a:ea typeface="+mj-ea"/>
+                    <a:cs typeface="+mj-cs"/>
+                  </a:rPr>
+                  <a:t>dfn</a:t>
+                </a:r>
+                <a:r>
+                  <a:rPr lang="en-GB" sz="2400" dirty="0">
+                    <a:solidFill>
+                      <a:prstClr val="black"/>
+                    </a:solidFill>
+                    <a:latin typeface="Atkinson Hyperlegible" pitchFamily="50" charset="0"/>
+                    <a:ea typeface="+mj-ea"/>
+                    <a:cs typeface="+mj-cs"/>
+                  </a:rPr>
+                  <a:t>:</a:t>
+                </a:r>
+              </a:p>
+              <a:p>
+                <a:r>
+                  <a:rPr lang="en-GB" sz="2400" dirty="0">
+                    <a:latin typeface="APL385 Unicode" panose="020B0709000202000203" pitchFamily="49" charset="0"/>
+                  </a:rPr>
+                  <a:t>            </a:t>
+                </a:r>
+                <a:r>
+                  <a:rPr lang="en-GB" sz="2400" dirty="0" err="1">
+                    <a:latin typeface="APL385 Unicode" panose="020B0709000202000203" pitchFamily="49" charset="0"/>
+                  </a:rPr>
+                  <a:t>F_d</a:t>
+                </a:r>
+                <a:r>
+                  <a:rPr lang="en-GB" sz="2400" dirty="0">
+                    <a:latin typeface="APL385 Unicode" panose="020B0709000202000203" pitchFamily="49" charset="0"/>
+                  </a:rPr>
+                  <a:t>¨⍳10</a:t>
+                </a:r>
+              </a:p>
+              <a:p>
+                <a:r>
+                  <a:rPr lang="en-GB" sz="2400" dirty="0">
+                    <a:latin typeface="APL385 Unicode" panose="020B0709000202000203" pitchFamily="49" charset="0"/>
+                  </a:rPr>
+                  <a:t>1 1 2 3 5 8 13 21 34 55</a:t>
                 </a:r>
               </a:p>
               <a:p>
@@ -5149,9 +5199,58 @@
               <a:p>
                 <a:r>
                   <a:rPr lang="en-GB" sz="2400" dirty="0">
+                    <a:solidFill>
+                      <a:prstClr val="black"/>
+                    </a:solidFill>
+                    <a:latin typeface="Atkinson Hyperlegible" pitchFamily="50" charset="0"/>
+                    <a:ea typeface="+mj-ea"/>
+                    <a:cs typeface="+mj-cs"/>
+                  </a:rPr>
+                  <a:t>Define </a:t>
+                </a:r>
+                <a:r>
+                  <a:rPr lang="en-GB" sz="2400" dirty="0" err="1">
+                    <a:solidFill>
+                      <a:prstClr val="black"/>
+                    </a:solidFill>
                     <a:latin typeface="APL385 Unicode" panose="020B0709000202000203" pitchFamily="49" charset="0"/>
+                    <a:ea typeface="+mj-ea"/>
+                    <a:cs typeface="+mj-cs"/>
                   </a:rPr>
-                  <a:t>            F¨⍳10</a:t>
+                  <a:t>F_t</a:t>
+                </a:r>
+                <a:r>
+                  <a:rPr lang="en-GB" sz="2400" dirty="0">
+                    <a:solidFill>
+                      <a:prstClr val="black"/>
+                    </a:solidFill>
+                    <a:latin typeface="Atkinson Hyperlegible" pitchFamily="50" charset="0"/>
+                    <a:ea typeface="+mj-ea"/>
+                    <a:cs typeface="+mj-cs"/>
+                  </a:rPr>
+                  <a:t> as a Fibonacci </a:t>
+                </a:r>
+                <a:r>
+                  <a:rPr lang="en-GB" sz="2400" dirty="0" err="1">
+                    <a:solidFill>
+                      <a:prstClr val="black"/>
+                    </a:solidFill>
+                    <a:latin typeface="Atkinson Hyperlegible" pitchFamily="50" charset="0"/>
+                    <a:ea typeface="+mj-ea"/>
+                    <a:cs typeface="+mj-cs"/>
+                  </a:rPr>
+                  <a:t>tradfn</a:t>
+                </a:r>
+                <a:r>
+                  <a:rPr lang="en-GB" sz="2400" dirty="0">
+                    <a:solidFill>
+                      <a:prstClr val="black"/>
+                    </a:solidFill>
+                    <a:latin typeface="Atkinson Hyperlegible" pitchFamily="50" charset="0"/>
+                    <a:ea typeface="+mj-ea"/>
+                    <a:cs typeface="+mj-cs"/>
+                  </a:rPr>
+                  <a:t>:</a:t>
                 </a:r>
               </a:p>
               <a:p>
@@ -5159,8 +5258,37 @@
                   <a:rPr lang="en-GB" sz="2400" dirty="0">
                     <a:latin typeface="APL385 Unicode" panose="020B0709000202000203" pitchFamily="49" charset="0"/>
                   </a:rPr>
-                  <a:t>1 1 2 3 5 8 13 21 34 55</a:t>
+                  <a:t>            </a:t>
                 </a:r>
+                <a:r>
+                  <a:rPr lang="en-GB" sz="2400" dirty="0" err="1">
+                    <a:latin typeface="APL385 Unicode" panose="020B0709000202000203" pitchFamily="49" charset="0"/>
+                  </a:rPr>
+                  <a:t>F_t</a:t>
+                </a:r>
+                <a:r>
+                  <a:rPr lang="en-GB" sz="2400" dirty="0">
+                    <a:latin typeface="APL385 Unicode" panose="020B0709000202000203" pitchFamily="49" charset="0"/>
+                  </a:rPr>
+                  <a:t>¨⍳10</a:t>
+                </a:r>
+              </a:p>
+              <a:p>
+                <a:r>
+                  <a:rPr lang="en-GB" sz="2400" dirty="0">
+                    <a:latin typeface="APL385 Unicode" panose="020B0709000202000203" pitchFamily="49" charset="0"/>
+                  </a:rPr>
+                  <a:t>1 1 2 3 5 8 13 21 </a:t>
+                </a:r>
+                <a:r>
+                  <a:rPr lang="en-GB" sz="2400">
+                    <a:latin typeface="APL385 Unicode" panose="020B0709000202000203" pitchFamily="49" charset="0"/>
+                  </a:rPr>
+                  <a:t>34 55</a:t>
+                </a:r>
+                <a:endParaRPr lang="en-GB" sz="2400" dirty="0">
+                  <a:latin typeface="APL385 Unicode" panose="020B0709000202000203" pitchFamily="49" charset="0"/>
+                </a:endParaRPr>
               </a:p>
             </p:txBody>
           </p:sp>
@@ -5183,7 +5311,7 @@
             <p:spPr>
               <a:xfrm>
                 <a:off x="696000" y="729000"/>
-                <a:ext cx="10800000" cy="4154984"/>
+                <a:ext cx="10800000" cy="5262979"/>
               </a:xfrm>
               <a:prstGeom prst="rect">
                 <a:avLst/>
@@ -5191,7 +5319,7 @@
               <a:blipFill>
                 <a:blip r:embed="rId2"/>
                 <a:stretch>
-                  <a:fillRect l="-847" t="-1175" b="-2496"/>
+                  <a:fillRect l="-847" t="-927" b="-1738"/>
                 </a:stretch>
               </a:blipFill>
             </p:spPr>

</xml_diff>